<commit_message>
separate ivig by inpt/outpt
</commit_message>
<xml_diff>
--- a/report/utilization/python_utilization_slides.pptx
+++ b/report/utilization/python_utilization_slides.pptx
@@ -23,6 +23,7 @@
     <p:sldId id="271" r:id="rId23"/>
     <p:sldId id="272" r:id="rId24"/>
     <p:sldId id="273" r:id="rId25"/>
+    <p:sldId id="274" r:id="rId26"/>
   </p:sldIdLst>
   <p:sldSz cx="9144000" cy="6858000" type="screen4x3"/>
   <p:notesSz cx="6858000" cy="9144000"/>
@@ -709,7 +710,7 @@
           <a:lstStyle/>
           <a:p>
             <a:r>
-              <a:t>Pegfilgrastim utilization</a:t>
+              <a:t>Calcitonin utilization</a:t>
             </a:r>
           </a:p>
         </c:rich>
@@ -791,7 +792,7 @@
                 <c:formatCode>General</c:formatCode>
                 <c:ptCount val="12"/>
                 <c:pt idx="0">
-                  <c:v>27.0</c:v>
+                  <c:v>2.0</c:v>
                 </c:pt>
               </c:numCache>
             </c:numRef>
@@ -867,40 +868,40 @@
                 <c:formatCode>General</c:formatCode>
                 <c:ptCount val="12"/>
                 <c:pt idx="0">
-                  <c:v>60.0</c:v>
+                  <c:v>0.0</c:v>
                 </c:pt>
                 <c:pt idx="1">
-                  <c:v>69.0</c:v>
+                  <c:v>16.0</c:v>
                 </c:pt>
                 <c:pt idx="2">
-                  <c:v>58.0</c:v>
+                  <c:v>6.0</c:v>
                 </c:pt>
                 <c:pt idx="3">
-                  <c:v>83.0</c:v>
+                  <c:v>2.0</c:v>
                 </c:pt>
                 <c:pt idx="4">
-                  <c:v>76.0</c:v>
+                  <c:v>0.0</c:v>
                 </c:pt>
                 <c:pt idx="5">
-                  <c:v>52.0</c:v>
+                  <c:v>9.0</c:v>
                 </c:pt>
                 <c:pt idx="6">
-                  <c:v>68.0</c:v>
+                  <c:v>13.0</c:v>
                 </c:pt>
                 <c:pt idx="7">
-                  <c:v>49.0</c:v>
+                  <c:v>0.0</c:v>
                 </c:pt>
                 <c:pt idx="8">
-                  <c:v>68.0</c:v>
+                  <c:v>11.0</c:v>
                 </c:pt>
                 <c:pt idx="9">
-                  <c:v>60.0</c:v>
+                  <c:v>12.0</c:v>
                 </c:pt>
                 <c:pt idx="10">
-                  <c:v>59.0</c:v>
+                  <c:v>6.0</c:v>
                 </c:pt>
                 <c:pt idx="11">
-                  <c:v>47.0</c:v>
+                  <c:v>5.0</c:v>
                 </c:pt>
               </c:numCache>
             </c:numRef>
@@ -976,40 +977,40 @@
                 <c:formatCode>General</c:formatCode>
                 <c:ptCount val="12"/>
                 <c:pt idx="0">
-                  <c:v>63.0</c:v>
+                  <c:v>2.0</c:v>
                 </c:pt>
                 <c:pt idx="1">
-                  <c:v>49.0</c:v>
+                  <c:v>12.0</c:v>
                 </c:pt>
                 <c:pt idx="2">
-                  <c:v>48.0</c:v>
+                  <c:v>8.0</c:v>
                 </c:pt>
                 <c:pt idx="3">
-                  <c:v>61.0</c:v>
+                  <c:v>1.0</c:v>
                 </c:pt>
                 <c:pt idx="4">
-                  <c:v>52.0</c:v>
+                  <c:v>1.0</c:v>
                 </c:pt>
                 <c:pt idx="5">
-                  <c:v>57.0</c:v>
+                  <c:v>6.0</c:v>
                 </c:pt>
                 <c:pt idx="6">
-                  <c:v>53.0</c:v>
+                  <c:v>18.0</c:v>
                 </c:pt>
                 <c:pt idx="7">
-                  <c:v>54.0</c:v>
+                  <c:v>8.0</c:v>
                 </c:pt>
                 <c:pt idx="8">
-                  <c:v>60.0</c:v>
+                  <c:v>4.0</c:v>
                 </c:pt>
                 <c:pt idx="9">
-                  <c:v>60.0</c:v>
+                  <c:v>4.0</c:v>
                 </c:pt>
                 <c:pt idx="10">
-                  <c:v>56.0</c:v>
+                  <c:v>17.0</c:v>
                 </c:pt>
                 <c:pt idx="11">
-                  <c:v>55.0</c:v>
+                  <c:v>1.0</c:v>
                 </c:pt>
               </c:numCache>
             </c:numRef>
@@ -1085,40 +1086,40 @@
                 <c:formatCode>General</c:formatCode>
                 <c:ptCount val="12"/>
                 <c:pt idx="0">
-                  <c:v>45.0</c:v>
+                  <c:v>59.0</c:v>
                 </c:pt>
                 <c:pt idx="1">
-                  <c:v>66.0</c:v>
+                  <c:v>19.0</c:v>
                 </c:pt>
                 <c:pt idx="2">
-                  <c:v>50.0</c:v>
+                  <c:v>4.0</c:v>
                 </c:pt>
                 <c:pt idx="3">
-                  <c:v>52.0</c:v>
+                  <c:v>3.0</c:v>
                 </c:pt>
                 <c:pt idx="4">
-                  <c:v>41.0</c:v>
+                  <c:v>4.0</c:v>
                 </c:pt>
                 <c:pt idx="5">
-                  <c:v>44.0</c:v>
+                  <c:v>1.0</c:v>
                 </c:pt>
                 <c:pt idx="6">
-                  <c:v>38.0</c:v>
+                  <c:v>2.0</c:v>
                 </c:pt>
                 <c:pt idx="7">
-                  <c:v>40.0</c:v>
+                  <c:v>0.0</c:v>
                 </c:pt>
                 <c:pt idx="8">
-                  <c:v>58.0</c:v>
+                  <c:v>6.0</c:v>
                 </c:pt>
                 <c:pt idx="9">
-                  <c:v>38.0</c:v>
+                  <c:v>9.0</c:v>
                 </c:pt>
                 <c:pt idx="10">
-                  <c:v>56.0</c:v>
+                  <c:v>23.0</c:v>
                 </c:pt>
                 <c:pt idx="11">
-                  <c:v>54.0</c:v>
+                  <c:v>10.0</c:v>
                 </c:pt>
               </c:numCache>
             </c:numRef>
@@ -1211,7 +1212,7 @@
           <a:lstStyle/>
           <a:p>
             <a:r>
-              <a:t>Eculizumab utilization</a:t>
+              <a:t>Pegfilgrastim utilization</a:t>
             </a:r>
           </a:p>
         </c:rich>
@@ -1293,7 +1294,7 @@
                 <c:formatCode>General</c:formatCode>
                 <c:ptCount val="12"/>
                 <c:pt idx="0">
-                  <c:v>9.0</c:v>
+                  <c:v>27.0</c:v>
                 </c:pt>
               </c:numCache>
             </c:numRef>
@@ -1369,40 +1370,40 @@
                 <c:formatCode>General</c:formatCode>
                 <c:ptCount val="12"/>
                 <c:pt idx="0">
-                  <c:v>15.0</c:v>
+                  <c:v>60.0</c:v>
                 </c:pt>
                 <c:pt idx="1">
-                  <c:v>13.0</c:v>
+                  <c:v>69.0</c:v>
                 </c:pt>
                 <c:pt idx="2">
-                  <c:v>9.0</c:v>
+                  <c:v>58.0</c:v>
                 </c:pt>
                 <c:pt idx="3">
-                  <c:v>10.0</c:v>
+                  <c:v>83.0</c:v>
                 </c:pt>
                 <c:pt idx="4">
-                  <c:v>11.0</c:v>
+                  <c:v>76.0</c:v>
                 </c:pt>
                 <c:pt idx="5">
-                  <c:v>13.0</c:v>
+                  <c:v>52.0</c:v>
                 </c:pt>
                 <c:pt idx="6">
-                  <c:v>15.0</c:v>
+                  <c:v>68.0</c:v>
                 </c:pt>
                 <c:pt idx="7">
-                  <c:v>8.0</c:v>
+                  <c:v>49.0</c:v>
                 </c:pt>
                 <c:pt idx="8">
-                  <c:v>9.0</c:v>
+                  <c:v>68.0</c:v>
                 </c:pt>
                 <c:pt idx="9">
-                  <c:v>9.0</c:v>
+                  <c:v>60.0</c:v>
                 </c:pt>
                 <c:pt idx="10">
-                  <c:v>10.0</c:v>
+                  <c:v>59.0</c:v>
                 </c:pt>
                 <c:pt idx="11">
-                  <c:v>9.0</c:v>
+                  <c:v>47.0</c:v>
                 </c:pt>
               </c:numCache>
             </c:numRef>
@@ -1478,40 +1479,40 @@
                 <c:formatCode>General</c:formatCode>
                 <c:ptCount val="12"/>
                 <c:pt idx="0">
-                  <c:v>13.0</c:v>
+                  <c:v>63.0</c:v>
                 </c:pt>
                 <c:pt idx="1">
-                  <c:v>16.0</c:v>
+                  <c:v>49.0</c:v>
                 </c:pt>
                 <c:pt idx="2">
-                  <c:v>12.0</c:v>
+                  <c:v>48.0</c:v>
                 </c:pt>
                 <c:pt idx="3">
-                  <c:v>16.0</c:v>
+                  <c:v>61.0</c:v>
                 </c:pt>
                 <c:pt idx="4">
-                  <c:v>15.0</c:v>
+                  <c:v>52.0</c:v>
                 </c:pt>
                 <c:pt idx="5">
-                  <c:v>16.0</c:v>
+                  <c:v>57.0</c:v>
                 </c:pt>
                 <c:pt idx="6">
-                  <c:v>14.0</c:v>
+                  <c:v>53.0</c:v>
                 </c:pt>
                 <c:pt idx="7">
-                  <c:v>11.0</c:v>
+                  <c:v>54.0</c:v>
                 </c:pt>
                 <c:pt idx="8">
-                  <c:v>12.0</c:v>
+                  <c:v>60.0</c:v>
                 </c:pt>
                 <c:pt idx="9">
-                  <c:v>12.0</c:v>
+                  <c:v>60.0</c:v>
                 </c:pt>
                 <c:pt idx="10">
-                  <c:v>12.0</c:v>
+                  <c:v>56.0</c:v>
                 </c:pt>
                 <c:pt idx="11">
-                  <c:v>16.0</c:v>
+                  <c:v>55.0</c:v>
                 </c:pt>
               </c:numCache>
             </c:numRef>
@@ -1587,40 +1588,40 @@
                 <c:formatCode>General</c:formatCode>
                 <c:ptCount val="12"/>
                 <c:pt idx="0">
-                  <c:v>14.0</c:v>
+                  <c:v>45.0</c:v>
                 </c:pt>
                 <c:pt idx="1">
-                  <c:v>10.0</c:v>
+                  <c:v>66.0</c:v>
                 </c:pt>
                 <c:pt idx="2">
-                  <c:v>11.0</c:v>
+                  <c:v>50.0</c:v>
                 </c:pt>
                 <c:pt idx="3">
-                  <c:v>11.0</c:v>
+                  <c:v>52.0</c:v>
                 </c:pt>
                 <c:pt idx="4">
-                  <c:v>13.0</c:v>
+                  <c:v>41.0</c:v>
                 </c:pt>
                 <c:pt idx="5">
-                  <c:v>13.0</c:v>
+                  <c:v>44.0</c:v>
                 </c:pt>
                 <c:pt idx="6">
-                  <c:v>9.0</c:v>
+                  <c:v>38.0</c:v>
                 </c:pt>
                 <c:pt idx="7">
-                  <c:v>11.0</c:v>
+                  <c:v>40.0</c:v>
                 </c:pt>
                 <c:pt idx="8">
-                  <c:v>16.0</c:v>
+                  <c:v>58.0</c:v>
                 </c:pt>
                 <c:pt idx="9">
-                  <c:v>14.0</c:v>
+                  <c:v>38.0</c:v>
                 </c:pt>
                 <c:pt idx="10">
-                  <c:v>15.0</c:v>
+                  <c:v>56.0</c:v>
                 </c:pt>
                 <c:pt idx="11">
-                  <c:v>17.0</c:v>
+                  <c:v>54.0</c:v>
                 </c:pt>
               </c:numCache>
             </c:numRef>
@@ -1713,7 +1714,7 @@
           <a:lstStyle/>
           <a:p>
             <a:r>
-              <a:t>Ceftaroline utilization</a:t>
+              <a:t>Eculizumab utilization</a:t>
             </a:r>
           </a:p>
         </c:rich>
@@ -1795,7 +1796,7 @@
                 <c:formatCode>General</c:formatCode>
                 <c:ptCount val="12"/>
                 <c:pt idx="0">
-                  <c:v>136.0</c:v>
+                  <c:v>9.0</c:v>
                 </c:pt>
               </c:numCache>
             </c:numRef>
@@ -1871,40 +1872,40 @@
                 <c:formatCode>General</c:formatCode>
                 <c:ptCount val="12"/>
                 <c:pt idx="0">
-                  <c:v>174.0</c:v>
+                  <c:v>15.0</c:v>
                 </c:pt>
                 <c:pt idx="1">
-                  <c:v>191.0</c:v>
+                  <c:v>13.0</c:v>
                 </c:pt>
                 <c:pt idx="2">
-                  <c:v>124.0</c:v>
+                  <c:v>9.0</c:v>
                 </c:pt>
                 <c:pt idx="3">
-                  <c:v>105.0</c:v>
+                  <c:v>10.0</c:v>
                 </c:pt>
                 <c:pt idx="4">
-                  <c:v>93.0</c:v>
+                  <c:v>11.0</c:v>
                 </c:pt>
                 <c:pt idx="5">
-                  <c:v>167.0</c:v>
+                  <c:v>13.0</c:v>
                 </c:pt>
                 <c:pt idx="6">
-                  <c:v>96.0</c:v>
+                  <c:v>15.0</c:v>
                 </c:pt>
                 <c:pt idx="7">
-                  <c:v>111.0</c:v>
+                  <c:v>8.0</c:v>
                 </c:pt>
                 <c:pt idx="8">
-                  <c:v>193.0</c:v>
+                  <c:v>9.0</c:v>
                 </c:pt>
                 <c:pt idx="9">
-                  <c:v>243.0</c:v>
+                  <c:v>9.0</c:v>
                 </c:pt>
                 <c:pt idx="10">
-                  <c:v>64.0</c:v>
+                  <c:v>10.0</c:v>
                 </c:pt>
                 <c:pt idx="11">
-                  <c:v>52.0</c:v>
+                  <c:v>9.0</c:v>
                 </c:pt>
               </c:numCache>
             </c:numRef>
@@ -1980,40 +1981,40 @@
                 <c:formatCode>General</c:formatCode>
                 <c:ptCount val="12"/>
                 <c:pt idx="0">
-                  <c:v>151.0</c:v>
+                  <c:v>13.0</c:v>
                 </c:pt>
                 <c:pt idx="1">
-                  <c:v>159.0</c:v>
+                  <c:v>16.0</c:v>
                 </c:pt>
                 <c:pt idx="2">
-                  <c:v>189.0</c:v>
+                  <c:v>12.0</c:v>
                 </c:pt>
                 <c:pt idx="3">
-                  <c:v>259.0</c:v>
+                  <c:v>16.0</c:v>
                 </c:pt>
                 <c:pt idx="4">
-                  <c:v>98.0</c:v>
+                  <c:v>15.0</c:v>
                 </c:pt>
                 <c:pt idx="5">
-                  <c:v>230.0</c:v>
+                  <c:v>16.0</c:v>
                 </c:pt>
                 <c:pt idx="6">
-                  <c:v>257.0</c:v>
+                  <c:v>14.0</c:v>
                 </c:pt>
                 <c:pt idx="7">
-                  <c:v>255.0</c:v>
+                  <c:v>11.0</c:v>
                 </c:pt>
                 <c:pt idx="8">
-                  <c:v>415.0</c:v>
+                  <c:v>12.0</c:v>
                 </c:pt>
                 <c:pt idx="9">
-                  <c:v>128.0</c:v>
+                  <c:v>12.0</c:v>
                 </c:pt>
                 <c:pt idx="10">
-                  <c:v>100.0</c:v>
+                  <c:v>12.0</c:v>
                 </c:pt>
                 <c:pt idx="11">
-                  <c:v>192.0</c:v>
+                  <c:v>16.0</c:v>
                 </c:pt>
               </c:numCache>
             </c:numRef>
@@ -2089,40 +2090,40 @@
                 <c:formatCode>General</c:formatCode>
                 <c:ptCount val="12"/>
                 <c:pt idx="0">
-                  <c:v>98.0</c:v>
+                  <c:v>14.0</c:v>
                 </c:pt>
                 <c:pt idx="1">
-                  <c:v>40.0</c:v>
+                  <c:v>10.0</c:v>
                 </c:pt>
                 <c:pt idx="2">
-                  <c:v>63.0</c:v>
+                  <c:v>11.0</c:v>
                 </c:pt>
                 <c:pt idx="3">
-                  <c:v>113.0</c:v>
+                  <c:v>11.0</c:v>
                 </c:pt>
                 <c:pt idx="4">
-                  <c:v>38.0</c:v>
+                  <c:v>13.0</c:v>
                 </c:pt>
                 <c:pt idx="5">
-                  <c:v>120.0</c:v>
+                  <c:v>13.0</c:v>
                 </c:pt>
                 <c:pt idx="6">
-                  <c:v>121.0</c:v>
+                  <c:v>9.0</c:v>
                 </c:pt>
                 <c:pt idx="7">
-                  <c:v>172.0</c:v>
+                  <c:v>11.0</c:v>
                 </c:pt>
                 <c:pt idx="8">
-                  <c:v>125.0</c:v>
+                  <c:v>16.0</c:v>
                 </c:pt>
                 <c:pt idx="9">
-                  <c:v>263.0</c:v>
+                  <c:v>14.0</c:v>
                 </c:pt>
                 <c:pt idx="10">
-                  <c:v>297.0</c:v>
+                  <c:v>15.0</c:v>
                 </c:pt>
                 <c:pt idx="11">
-                  <c:v>59.0</c:v>
+                  <c:v>17.0</c:v>
                 </c:pt>
               </c:numCache>
             </c:numRef>
@@ -2215,7 +2216,7 @@
           <a:lstStyle/>
           <a:p>
             <a:r>
-              <a:t>Ceftazidime-Avibactam utilization</a:t>
+              <a:t>Ceftaroline utilization</a:t>
             </a:r>
           </a:p>
         </c:rich>
@@ -2297,7 +2298,7 @@
                 <c:formatCode>General</c:formatCode>
                 <c:ptCount val="12"/>
                 <c:pt idx="0">
-                  <c:v>59.0</c:v>
+                  <c:v>136.0</c:v>
                 </c:pt>
               </c:numCache>
             </c:numRef>
@@ -2373,40 +2374,40 @@
                 <c:formatCode>General</c:formatCode>
                 <c:ptCount val="12"/>
                 <c:pt idx="0">
-                  <c:v>73.0</c:v>
+                  <c:v>174.0</c:v>
                 </c:pt>
                 <c:pt idx="1">
-                  <c:v>13.0</c:v>
+                  <c:v>191.0</c:v>
                 </c:pt>
                 <c:pt idx="2">
-                  <c:v>81.0</c:v>
+                  <c:v>124.0</c:v>
                 </c:pt>
                 <c:pt idx="3">
-                  <c:v>128.0</c:v>
+                  <c:v>105.0</c:v>
                 </c:pt>
                 <c:pt idx="4">
-                  <c:v>14.0</c:v>
+                  <c:v>93.0</c:v>
                 </c:pt>
                 <c:pt idx="5">
-                  <c:v>218.0</c:v>
+                  <c:v>167.0</c:v>
                 </c:pt>
                 <c:pt idx="6">
-                  <c:v>141.0</c:v>
+                  <c:v>96.0</c:v>
                 </c:pt>
                 <c:pt idx="7">
-                  <c:v>76.0</c:v>
+                  <c:v>111.0</c:v>
                 </c:pt>
                 <c:pt idx="8">
-                  <c:v>127.0</c:v>
+                  <c:v>193.0</c:v>
                 </c:pt>
                 <c:pt idx="9">
-                  <c:v>92.0</c:v>
+                  <c:v>243.0</c:v>
                 </c:pt>
                 <c:pt idx="10">
-                  <c:v>110.0</c:v>
+                  <c:v>64.0</c:v>
                 </c:pt>
                 <c:pt idx="11">
-                  <c:v>63.0</c:v>
+                  <c:v>52.0</c:v>
                 </c:pt>
               </c:numCache>
             </c:numRef>
@@ -2482,40 +2483,40 @@
                 <c:formatCode>General</c:formatCode>
                 <c:ptCount val="12"/>
                 <c:pt idx="0">
-                  <c:v>103.0</c:v>
+                  <c:v>151.0</c:v>
                 </c:pt>
                 <c:pt idx="1">
-                  <c:v>68.0</c:v>
+                  <c:v>159.0</c:v>
                 </c:pt>
                 <c:pt idx="2">
+                  <c:v>189.0</c:v>
+                </c:pt>
+                <c:pt idx="3">
+                  <c:v>259.0</c:v>
+                </c:pt>
+                <c:pt idx="4">
+                  <c:v>98.0</c:v>
+                </c:pt>
+                <c:pt idx="5">
+                  <c:v>230.0</c:v>
+                </c:pt>
+                <c:pt idx="6">
+                  <c:v>257.0</c:v>
+                </c:pt>
+                <c:pt idx="7">
+                  <c:v>255.0</c:v>
+                </c:pt>
+                <c:pt idx="8">
+                  <c:v>415.0</c:v>
+                </c:pt>
+                <c:pt idx="9">
                   <c:v>128.0</c:v>
                 </c:pt>
-                <c:pt idx="3">
-                  <c:v>86.0</c:v>
-                </c:pt>
-                <c:pt idx="4">
-                  <c:v>34.0</c:v>
-                </c:pt>
-                <c:pt idx="5">
-                  <c:v>65.0</c:v>
-                </c:pt>
-                <c:pt idx="6">
-                  <c:v>8.0</c:v>
-                </c:pt>
-                <c:pt idx="7">
-                  <c:v>42.0</c:v>
-                </c:pt>
-                <c:pt idx="8">
-                  <c:v>78.0</c:v>
-                </c:pt>
-                <c:pt idx="9">
-                  <c:v>8.0</c:v>
-                </c:pt>
                 <c:pt idx="10">
-                  <c:v>44.0</c:v>
+                  <c:v>100.0</c:v>
                 </c:pt>
                 <c:pt idx="11">
-                  <c:v>16.0</c:v>
+                  <c:v>192.0</c:v>
                 </c:pt>
               </c:numCache>
             </c:numRef>
@@ -2591,40 +2592,40 @@
                 <c:formatCode>General</c:formatCode>
                 <c:ptCount val="12"/>
                 <c:pt idx="0">
-                  <c:v>33.0</c:v>
+                  <c:v>98.0</c:v>
                 </c:pt>
                 <c:pt idx="1">
-                  <c:v>0.0</c:v>
+                  <c:v>40.0</c:v>
                 </c:pt>
                 <c:pt idx="2">
-                  <c:v>0.0</c:v>
+                  <c:v>63.0</c:v>
                 </c:pt>
                 <c:pt idx="3">
-                  <c:v>0.0</c:v>
+                  <c:v>113.0</c:v>
                 </c:pt>
                 <c:pt idx="4">
-                  <c:v>0.0</c:v>
+                  <c:v>38.0</c:v>
                 </c:pt>
                 <c:pt idx="5">
-                  <c:v>10.0</c:v>
+                  <c:v>120.0</c:v>
                 </c:pt>
                 <c:pt idx="6">
-                  <c:v>133.0</c:v>
+                  <c:v>121.0</c:v>
                 </c:pt>
                 <c:pt idx="7">
-                  <c:v>37.0</c:v>
+                  <c:v>172.0</c:v>
                 </c:pt>
                 <c:pt idx="8">
-                  <c:v>0.0</c:v>
+                  <c:v>125.0</c:v>
                 </c:pt>
                 <c:pt idx="9">
-                  <c:v>58.0</c:v>
+                  <c:v>263.0</c:v>
                 </c:pt>
                 <c:pt idx="10">
-                  <c:v>24.0</c:v>
+                  <c:v>297.0</c:v>
                 </c:pt>
                 <c:pt idx="11">
-                  <c:v>54.0</c:v>
+                  <c:v>59.0</c:v>
                 </c:pt>
               </c:numCache>
             </c:numRef>
@@ -2717,7 +2718,7 @@
           <a:lstStyle/>
           <a:p>
             <a:r>
-              <a:t>Ceftolozane-Tazobactam utilization</a:t>
+              <a:t>Ceftazidime-Avibactam utilization</a:t>
             </a:r>
           </a:p>
         </c:rich>
@@ -2799,7 +2800,7 @@
                 <c:formatCode>General</c:formatCode>
                 <c:ptCount val="12"/>
                 <c:pt idx="0">
-                  <c:v>140.0</c:v>
+                  <c:v>59.0</c:v>
                 </c:pt>
               </c:numCache>
             </c:numRef>
@@ -2875,40 +2876,40 @@
                 <c:formatCode>General</c:formatCode>
                 <c:ptCount val="12"/>
                 <c:pt idx="0">
-                  <c:v>214.0</c:v>
+                  <c:v>73.0</c:v>
                 </c:pt>
                 <c:pt idx="1">
-                  <c:v>172.0</c:v>
+                  <c:v>13.0</c:v>
                 </c:pt>
                 <c:pt idx="2">
-                  <c:v>75.0</c:v>
+                  <c:v>81.0</c:v>
                 </c:pt>
                 <c:pt idx="3">
-                  <c:v>69.0</c:v>
+                  <c:v>128.0</c:v>
                 </c:pt>
                 <c:pt idx="4">
-                  <c:v>70.0</c:v>
+                  <c:v>14.0</c:v>
                 </c:pt>
                 <c:pt idx="5">
-                  <c:v>104.0</c:v>
+                  <c:v>218.0</c:v>
                 </c:pt>
                 <c:pt idx="6">
-                  <c:v>84.0</c:v>
+                  <c:v>141.0</c:v>
                 </c:pt>
                 <c:pt idx="7">
-                  <c:v>4.0</c:v>
+                  <c:v>76.0</c:v>
                 </c:pt>
                 <c:pt idx="8">
-                  <c:v>38.0</c:v>
+                  <c:v>127.0</c:v>
                 </c:pt>
                 <c:pt idx="9">
-                  <c:v>80.0</c:v>
+                  <c:v>92.0</c:v>
                 </c:pt>
                 <c:pt idx="10">
-                  <c:v>107.0</c:v>
+                  <c:v>110.0</c:v>
                 </c:pt>
                 <c:pt idx="11">
-                  <c:v>68.0</c:v>
+                  <c:v>63.0</c:v>
                 </c:pt>
               </c:numCache>
             </c:numRef>
@@ -2984,40 +2985,40 @@
                 <c:formatCode>General</c:formatCode>
                 <c:ptCount val="12"/>
                 <c:pt idx="0">
-                  <c:v>149.0</c:v>
+                  <c:v>103.0</c:v>
                 </c:pt>
                 <c:pt idx="1">
-                  <c:v>180.0</c:v>
+                  <c:v>68.0</c:v>
                 </c:pt>
                 <c:pt idx="2">
-                  <c:v>147.0</c:v>
+                  <c:v>128.0</c:v>
                 </c:pt>
                 <c:pt idx="3">
+                  <c:v>86.0</c:v>
+                </c:pt>
+                <c:pt idx="4">
+                  <c:v>34.0</c:v>
+                </c:pt>
+                <c:pt idx="5">
+                  <c:v>65.0</c:v>
+                </c:pt>
+                <c:pt idx="6">
                   <c:v>8.0</c:v>
                 </c:pt>
-                <c:pt idx="4">
-                  <c:v>36.0</c:v>
-                </c:pt>
-                <c:pt idx="5">
-                  <c:v>86.0</c:v>
-                </c:pt>
-                <c:pt idx="6">
-                  <c:v>14.0</c:v>
-                </c:pt>
                 <c:pt idx="7">
-                  <c:v>59.0</c:v>
+                  <c:v>42.0</c:v>
                 </c:pt>
                 <c:pt idx="8">
-                  <c:v>128.0</c:v>
+                  <c:v>78.0</c:v>
                 </c:pt>
                 <c:pt idx="9">
-                  <c:v>133.0</c:v>
+                  <c:v>8.0</c:v>
                 </c:pt>
                 <c:pt idx="10">
-                  <c:v>288.0</c:v>
+                  <c:v>44.0</c:v>
                 </c:pt>
                 <c:pt idx="11">
-                  <c:v>353.0</c:v>
+                  <c:v>16.0</c:v>
                 </c:pt>
               </c:numCache>
             </c:numRef>
@@ -3093,40 +3094,40 @@
                 <c:formatCode>General</c:formatCode>
                 <c:ptCount val="12"/>
                 <c:pt idx="0">
-                  <c:v>139.0</c:v>
+                  <c:v>33.0</c:v>
                 </c:pt>
                 <c:pt idx="1">
-                  <c:v>28.0</c:v>
+                  <c:v>0.0</c:v>
                 </c:pt>
                 <c:pt idx="2">
-                  <c:v>155.0</c:v>
+                  <c:v>0.0</c:v>
                 </c:pt>
                 <c:pt idx="3">
-                  <c:v>17.0</c:v>
+                  <c:v>0.0</c:v>
                 </c:pt>
                 <c:pt idx="4">
-                  <c:v>17.0</c:v>
+                  <c:v>0.0</c:v>
                 </c:pt>
                 <c:pt idx="5">
-                  <c:v>14.0</c:v>
+                  <c:v>10.0</c:v>
                 </c:pt>
                 <c:pt idx="6">
-                  <c:v>114.0</c:v>
+                  <c:v>133.0</c:v>
                 </c:pt>
                 <c:pt idx="7">
-                  <c:v>83.0</c:v>
+                  <c:v>37.0</c:v>
                 </c:pt>
                 <c:pt idx="8">
-                  <c:v>123.0</c:v>
+                  <c:v>0.0</c:v>
                 </c:pt>
                 <c:pt idx="9">
-                  <c:v>76.0</c:v>
+                  <c:v>58.0</c:v>
                 </c:pt>
                 <c:pt idx="10">
-                  <c:v>31.0</c:v>
+                  <c:v>24.0</c:v>
                 </c:pt>
                 <c:pt idx="11">
-                  <c:v>185.0</c:v>
+                  <c:v>54.0</c:v>
                 </c:pt>
               </c:numCache>
             </c:numRef>
@@ -3219,7 +3220,7 @@
           <a:lstStyle/>
           <a:p>
             <a:r>
-              <a:t>Daptomycin utilization</a:t>
+              <a:t>Ceftolozane-Tazobactam utilization</a:t>
             </a:r>
           </a:p>
         </c:rich>
@@ -3301,7 +3302,7 @@
                 <c:formatCode>General</c:formatCode>
                 <c:ptCount val="12"/>
                 <c:pt idx="0">
-                  <c:v>20.0</c:v>
+                  <c:v>140.0</c:v>
                 </c:pt>
               </c:numCache>
             </c:numRef>
@@ -3377,40 +3378,40 @@
                 <c:formatCode>General</c:formatCode>
                 <c:ptCount val="12"/>
                 <c:pt idx="0">
-                  <c:v>86.0</c:v>
+                  <c:v>214.0</c:v>
                 </c:pt>
                 <c:pt idx="1">
-                  <c:v>73.0</c:v>
+                  <c:v>172.0</c:v>
                 </c:pt>
                 <c:pt idx="2">
-                  <c:v>110.0</c:v>
+                  <c:v>75.0</c:v>
                 </c:pt>
                 <c:pt idx="3">
-                  <c:v>97.0</c:v>
+                  <c:v>69.0</c:v>
                 </c:pt>
                 <c:pt idx="4">
-                  <c:v>148.0</c:v>
+                  <c:v>70.0</c:v>
                 </c:pt>
                 <c:pt idx="5">
-                  <c:v>92.0</c:v>
+                  <c:v>104.0</c:v>
                 </c:pt>
                 <c:pt idx="6">
-                  <c:v>55.0</c:v>
+                  <c:v>84.0</c:v>
                 </c:pt>
                 <c:pt idx="7">
-                  <c:v>52.0</c:v>
+                  <c:v>4.0</c:v>
                 </c:pt>
                 <c:pt idx="8">
-                  <c:v>70.0</c:v>
+                  <c:v>38.0</c:v>
                 </c:pt>
                 <c:pt idx="9">
-                  <c:v>103.0</c:v>
+                  <c:v>80.0</c:v>
                 </c:pt>
                 <c:pt idx="10">
-                  <c:v>137.0</c:v>
+                  <c:v>107.0</c:v>
                 </c:pt>
                 <c:pt idx="11">
-                  <c:v>220.0</c:v>
+                  <c:v>68.0</c:v>
                 </c:pt>
               </c:numCache>
             </c:numRef>
@@ -3486,40 +3487,40 @@
                 <c:formatCode>General</c:formatCode>
                 <c:ptCount val="12"/>
                 <c:pt idx="0">
-                  <c:v>152.0</c:v>
+                  <c:v>149.0</c:v>
                 </c:pt>
                 <c:pt idx="1">
-                  <c:v>99.0</c:v>
+                  <c:v>180.0</c:v>
                 </c:pt>
                 <c:pt idx="2">
-                  <c:v>144.0</c:v>
+                  <c:v>147.0</c:v>
                 </c:pt>
                 <c:pt idx="3">
-                  <c:v>85.0</c:v>
+                  <c:v>8.0</c:v>
                 </c:pt>
                 <c:pt idx="4">
-                  <c:v>158.0</c:v>
+                  <c:v>36.0</c:v>
                 </c:pt>
                 <c:pt idx="5">
+                  <c:v>86.0</c:v>
+                </c:pt>
+                <c:pt idx="6">
+                  <c:v>14.0</c:v>
+                </c:pt>
+                <c:pt idx="7">
+                  <c:v>59.0</c:v>
+                </c:pt>
+                <c:pt idx="8">
                   <c:v>128.0</c:v>
                 </c:pt>
-                <c:pt idx="6">
-                  <c:v>96.0</c:v>
-                </c:pt>
-                <c:pt idx="7">
-                  <c:v>102.0</c:v>
-                </c:pt>
-                <c:pt idx="8">
-                  <c:v>230.0</c:v>
-                </c:pt>
                 <c:pt idx="9">
-                  <c:v>155.0</c:v>
+                  <c:v>133.0</c:v>
                 </c:pt>
                 <c:pt idx="10">
-                  <c:v>102.0</c:v>
+                  <c:v>288.0</c:v>
                 </c:pt>
                 <c:pt idx="11">
-                  <c:v>95.0</c:v>
+                  <c:v>353.0</c:v>
                 </c:pt>
               </c:numCache>
             </c:numRef>
@@ -3595,40 +3596,40 @@
                 <c:formatCode>General</c:formatCode>
                 <c:ptCount val="12"/>
                 <c:pt idx="0">
-                  <c:v>218.0</c:v>
+                  <c:v>139.0</c:v>
                 </c:pt>
                 <c:pt idx="1">
-                  <c:v>103.0</c:v>
+                  <c:v>28.0</c:v>
                 </c:pt>
                 <c:pt idx="2">
+                  <c:v>155.0</c:v>
+                </c:pt>
+                <c:pt idx="3">
+                  <c:v>17.0</c:v>
+                </c:pt>
+                <c:pt idx="4">
+                  <c:v>17.0</c:v>
+                </c:pt>
+                <c:pt idx="5">
+                  <c:v>14.0</c:v>
+                </c:pt>
+                <c:pt idx="6">
+                  <c:v>114.0</c:v>
+                </c:pt>
+                <c:pt idx="7">
+                  <c:v>83.0</c:v>
+                </c:pt>
+                <c:pt idx="8">
                   <c:v>123.0</c:v>
                 </c:pt>
-                <c:pt idx="3">
-                  <c:v>135.0</c:v>
-                </c:pt>
-                <c:pt idx="4">
-                  <c:v>74.0</c:v>
-                </c:pt>
-                <c:pt idx="5">
-                  <c:v>130.0</c:v>
-                </c:pt>
-                <c:pt idx="6">
-                  <c:v>149.0</c:v>
-                </c:pt>
-                <c:pt idx="7">
-                  <c:v>118.0</c:v>
-                </c:pt>
-                <c:pt idx="8">
-                  <c:v>163.0</c:v>
-                </c:pt>
                 <c:pt idx="9">
-                  <c:v>104.0</c:v>
+                  <c:v>76.0</c:v>
                 </c:pt>
                 <c:pt idx="10">
-                  <c:v>106.0</c:v>
+                  <c:v>31.0</c:v>
                 </c:pt>
                 <c:pt idx="11">
-                  <c:v>100.0</c:v>
+                  <c:v>185.0</c:v>
                 </c:pt>
               </c:numCache>
             </c:numRef>
@@ -3721,7 +3722,7 @@
           <a:lstStyle/>
           <a:p>
             <a:r>
-              <a:t>Ertapenem utilization</a:t>
+              <a:t>Daptomycin utilization</a:t>
             </a:r>
           </a:p>
         </c:rich>
@@ -3803,7 +3804,7 @@
                 <c:formatCode>General</c:formatCode>
                 <c:ptCount val="12"/>
                 <c:pt idx="0">
-                  <c:v>137.0</c:v>
+                  <c:v>20.0</c:v>
                 </c:pt>
               </c:numCache>
             </c:numRef>
@@ -3879,40 +3880,40 @@
                 <c:formatCode>General</c:formatCode>
                 <c:ptCount val="12"/>
                 <c:pt idx="0">
-                  <c:v>105.0</c:v>
+                  <c:v>86.0</c:v>
                 </c:pt>
                 <c:pt idx="1">
-                  <c:v>129.0</c:v>
+                  <c:v>73.0</c:v>
                 </c:pt>
                 <c:pt idx="2">
+                  <c:v>110.0</c:v>
+                </c:pt>
+                <c:pt idx="3">
+                  <c:v>97.0</c:v>
+                </c:pt>
+                <c:pt idx="4">
                   <c:v>148.0</c:v>
                 </c:pt>
-                <c:pt idx="3">
-                  <c:v>167.0</c:v>
-                </c:pt>
-                <c:pt idx="4">
-                  <c:v>124.0</c:v>
-                </c:pt>
                 <c:pt idx="5">
-                  <c:v>69.0</c:v>
+                  <c:v>92.0</c:v>
                 </c:pt>
                 <c:pt idx="6">
-                  <c:v>142.0</c:v>
+                  <c:v>55.0</c:v>
                 </c:pt>
                 <c:pt idx="7">
-                  <c:v>107.0</c:v>
+                  <c:v>52.0</c:v>
                 </c:pt>
                 <c:pt idx="8">
+                  <c:v>70.0</c:v>
+                </c:pt>
+                <c:pt idx="9">
                   <c:v>103.0</c:v>
                 </c:pt>
-                <c:pt idx="9">
-                  <c:v>122.0</c:v>
-                </c:pt>
                 <c:pt idx="10">
-                  <c:v>203.0</c:v>
+                  <c:v>137.0</c:v>
                 </c:pt>
                 <c:pt idx="11">
-                  <c:v>123.0</c:v>
+                  <c:v>220.0</c:v>
                 </c:pt>
               </c:numCache>
             </c:numRef>
@@ -3988,40 +3989,40 @@
                 <c:formatCode>General</c:formatCode>
                 <c:ptCount val="12"/>
                 <c:pt idx="0">
-                  <c:v>122.0</c:v>
+                  <c:v>152.0</c:v>
                 </c:pt>
                 <c:pt idx="1">
-                  <c:v>121.0</c:v>
+                  <c:v>99.0</c:v>
                 </c:pt>
                 <c:pt idx="2">
-                  <c:v>102.0</c:v>
+                  <c:v>144.0</c:v>
                 </c:pt>
                 <c:pt idx="3">
+                  <c:v>85.0</c:v>
+                </c:pt>
+                <c:pt idx="4">
+                  <c:v>158.0</c:v>
+                </c:pt>
+                <c:pt idx="5">
                   <c:v>128.0</c:v>
                 </c:pt>
-                <c:pt idx="4">
-                  <c:v>161.0</c:v>
-                </c:pt>
-                <c:pt idx="5">
-                  <c:v>185.0</c:v>
-                </c:pt>
                 <c:pt idx="6">
-                  <c:v>229.0</c:v>
+                  <c:v>96.0</c:v>
                 </c:pt>
                 <c:pt idx="7">
                   <c:v>102.0</c:v>
                 </c:pt>
                 <c:pt idx="8">
-                  <c:v>132.0</c:v>
+                  <c:v>230.0</c:v>
                 </c:pt>
                 <c:pt idx="9">
-                  <c:v>188.0</c:v>
+                  <c:v>155.0</c:v>
                 </c:pt>
                 <c:pt idx="10">
-                  <c:v>128.0</c:v>
+                  <c:v>102.0</c:v>
                 </c:pt>
                 <c:pt idx="11">
-                  <c:v>143.0</c:v>
+                  <c:v>95.0</c:v>
                 </c:pt>
               </c:numCache>
             </c:numRef>
@@ -4097,40 +4098,40 @@
                 <c:formatCode>General</c:formatCode>
                 <c:ptCount val="12"/>
                 <c:pt idx="0">
-                  <c:v>82.0</c:v>
+                  <c:v>218.0</c:v>
                 </c:pt>
                 <c:pt idx="1">
-                  <c:v>96.0</c:v>
+                  <c:v>103.0</c:v>
                 </c:pt>
                 <c:pt idx="2">
-                  <c:v>152.0</c:v>
+                  <c:v>123.0</c:v>
                 </c:pt>
                 <c:pt idx="3">
-                  <c:v>134.0</c:v>
+                  <c:v>135.0</c:v>
                 </c:pt>
                 <c:pt idx="4">
-                  <c:v>186.0</c:v>
+                  <c:v>74.0</c:v>
                 </c:pt>
                 <c:pt idx="5">
-                  <c:v>157.0</c:v>
+                  <c:v>130.0</c:v>
                 </c:pt>
                 <c:pt idx="6">
-                  <c:v>203.0</c:v>
+                  <c:v>149.0</c:v>
                 </c:pt>
                 <c:pt idx="7">
-                  <c:v>137.0</c:v>
+                  <c:v>118.0</c:v>
                 </c:pt>
                 <c:pt idx="8">
-                  <c:v>155.0</c:v>
+                  <c:v>163.0</c:v>
                 </c:pt>
                 <c:pt idx="9">
-                  <c:v>197.0</c:v>
+                  <c:v>104.0</c:v>
                 </c:pt>
                 <c:pt idx="10">
-                  <c:v>145.0</c:v>
+                  <c:v>106.0</c:v>
                 </c:pt>
                 <c:pt idx="11">
-                  <c:v>157.0</c:v>
+                  <c:v>100.0</c:v>
                 </c:pt>
               </c:numCache>
             </c:numRef>
@@ -4213,6 +4214,508 @@
 </file>
 
 <file path=ppt/charts/chart17.xml><?xml version="1.0" encoding="utf-8"?>
+<c:chartSpace xmlns:c="http://schemas.openxmlformats.org/drawingml/2006/chart" xmlns:a="http://schemas.openxmlformats.org/drawingml/2006/main" xmlns:r="http://schemas.openxmlformats.org/officeDocument/2006/relationships">
+  <c:date1904 val="0"/>
+  <c:chart>
+    <c:title>
+      <c:tx>
+        <c:rich>
+          <a:bodyPr/>
+          <a:lstStyle/>
+          <a:p>
+            <a:r>
+              <a:t>Ertapenem utilization</a:t>
+            </a:r>
+          </a:p>
+        </c:rich>
+      </c:tx>
+      <c:layout/>
+      <c:overlay val="0"/>
+    </c:title>
+    <c:autoTitleDeleted val="0"/>
+    <c:plotArea>
+      <c:lineChart>
+        <c:grouping val="standard"/>
+        <c:varyColors val="0"/>
+        <c:ser>
+          <c:idx val="0"/>
+          <c:order val="0"/>
+          <c:tx>
+            <c:strRef>
+              <c:f>Sheet1!$B$1</c:f>
+              <c:strCache>
+                <c:ptCount val="1"/>
+                <c:pt idx="0">
+                  <c:v>FY20</c:v>
+                </c:pt>
+              </c:strCache>
+            </c:strRef>
+          </c:tx>
+          <c:marker>
+            <c:symbol val="none"/>
+          </c:marker>
+          <c:cat>
+            <c:numRef>
+              <c:f>Sheet1!$A$2:$A$13</c:f>
+              <c:numCache>
+                <c:formatCode>yyyy\-mm\-dd</c:formatCode>
+                <c:ptCount val="12"/>
+                <c:pt idx="0">
+                  <c:v>43647.0</c:v>
+                </c:pt>
+                <c:pt idx="1">
+                  <c:v>43678.0</c:v>
+                </c:pt>
+                <c:pt idx="2">
+                  <c:v>43709.0</c:v>
+                </c:pt>
+                <c:pt idx="3">
+                  <c:v>43739.0</c:v>
+                </c:pt>
+                <c:pt idx="4">
+                  <c:v>43770.0</c:v>
+                </c:pt>
+                <c:pt idx="5">
+                  <c:v>43800.0</c:v>
+                </c:pt>
+                <c:pt idx="6">
+                  <c:v>43831.0</c:v>
+                </c:pt>
+                <c:pt idx="7">
+                  <c:v>43862.0</c:v>
+                </c:pt>
+                <c:pt idx="8">
+                  <c:v>43891.0</c:v>
+                </c:pt>
+                <c:pt idx="9">
+                  <c:v>43922.0</c:v>
+                </c:pt>
+                <c:pt idx="10">
+                  <c:v>43952.0</c:v>
+                </c:pt>
+                <c:pt idx="11">
+                  <c:v>43983.0</c:v>
+                </c:pt>
+              </c:numCache>
+            </c:numRef>
+          </c:cat>
+          <c:val>
+            <c:numRef>
+              <c:f>Sheet1!$B$2:$B$13</c:f>
+              <c:numCache>
+                <c:formatCode>General</c:formatCode>
+                <c:ptCount val="12"/>
+                <c:pt idx="0">
+                  <c:v>137.0</c:v>
+                </c:pt>
+              </c:numCache>
+            </c:numRef>
+          </c:val>
+          <c:smooth val="0"/>
+        </c:ser>
+        <c:ser>
+          <c:idx val="1"/>
+          <c:order val="1"/>
+          <c:tx>
+            <c:strRef>
+              <c:f>Sheet1!$C$1</c:f>
+              <c:strCache>
+                <c:ptCount val="1"/>
+                <c:pt idx="0">
+                  <c:v>FY19</c:v>
+                </c:pt>
+              </c:strCache>
+            </c:strRef>
+          </c:tx>
+          <c:marker>
+            <c:symbol val="none"/>
+          </c:marker>
+          <c:cat>
+            <c:numRef>
+              <c:f>Sheet1!$A$2:$A$13</c:f>
+              <c:numCache>
+                <c:formatCode>yyyy\-mm\-dd</c:formatCode>
+                <c:ptCount val="12"/>
+                <c:pt idx="0">
+                  <c:v>43647.0</c:v>
+                </c:pt>
+                <c:pt idx="1">
+                  <c:v>43678.0</c:v>
+                </c:pt>
+                <c:pt idx="2">
+                  <c:v>43709.0</c:v>
+                </c:pt>
+                <c:pt idx="3">
+                  <c:v>43739.0</c:v>
+                </c:pt>
+                <c:pt idx="4">
+                  <c:v>43770.0</c:v>
+                </c:pt>
+                <c:pt idx="5">
+                  <c:v>43800.0</c:v>
+                </c:pt>
+                <c:pt idx="6">
+                  <c:v>43831.0</c:v>
+                </c:pt>
+                <c:pt idx="7">
+                  <c:v>43862.0</c:v>
+                </c:pt>
+                <c:pt idx="8">
+                  <c:v>43891.0</c:v>
+                </c:pt>
+                <c:pt idx="9">
+                  <c:v>43922.0</c:v>
+                </c:pt>
+                <c:pt idx="10">
+                  <c:v>43952.0</c:v>
+                </c:pt>
+                <c:pt idx="11">
+                  <c:v>43983.0</c:v>
+                </c:pt>
+              </c:numCache>
+            </c:numRef>
+          </c:cat>
+          <c:val>
+            <c:numRef>
+              <c:f>Sheet1!$C$2:$C$13</c:f>
+              <c:numCache>
+                <c:formatCode>General</c:formatCode>
+                <c:ptCount val="12"/>
+                <c:pt idx="0">
+                  <c:v>105.0</c:v>
+                </c:pt>
+                <c:pt idx="1">
+                  <c:v>129.0</c:v>
+                </c:pt>
+                <c:pt idx="2">
+                  <c:v>148.0</c:v>
+                </c:pt>
+                <c:pt idx="3">
+                  <c:v>167.0</c:v>
+                </c:pt>
+                <c:pt idx="4">
+                  <c:v>124.0</c:v>
+                </c:pt>
+                <c:pt idx="5">
+                  <c:v>69.0</c:v>
+                </c:pt>
+                <c:pt idx="6">
+                  <c:v>142.0</c:v>
+                </c:pt>
+                <c:pt idx="7">
+                  <c:v>107.0</c:v>
+                </c:pt>
+                <c:pt idx="8">
+                  <c:v>103.0</c:v>
+                </c:pt>
+                <c:pt idx="9">
+                  <c:v>122.0</c:v>
+                </c:pt>
+                <c:pt idx="10">
+                  <c:v>203.0</c:v>
+                </c:pt>
+                <c:pt idx="11">
+                  <c:v>123.0</c:v>
+                </c:pt>
+              </c:numCache>
+            </c:numRef>
+          </c:val>
+          <c:smooth val="0"/>
+        </c:ser>
+        <c:ser>
+          <c:idx val="2"/>
+          <c:order val="2"/>
+          <c:tx>
+            <c:strRef>
+              <c:f>Sheet1!$D$1</c:f>
+              <c:strCache>
+                <c:ptCount val="1"/>
+                <c:pt idx="0">
+                  <c:v>FY18</c:v>
+                </c:pt>
+              </c:strCache>
+            </c:strRef>
+          </c:tx>
+          <c:marker>
+            <c:symbol val="none"/>
+          </c:marker>
+          <c:cat>
+            <c:numRef>
+              <c:f>Sheet1!$A$2:$A$13</c:f>
+              <c:numCache>
+                <c:formatCode>yyyy\-mm\-dd</c:formatCode>
+                <c:ptCount val="12"/>
+                <c:pt idx="0">
+                  <c:v>43647.0</c:v>
+                </c:pt>
+                <c:pt idx="1">
+                  <c:v>43678.0</c:v>
+                </c:pt>
+                <c:pt idx="2">
+                  <c:v>43709.0</c:v>
+                </c:pt>
+                <c:pt idx="3">
+                  <c:v>43739.0</c:v>
+                </c:pt>
+                <c:pt idx="4">
+                  <c:v>43770.0</c:v>
+                </c:pt>
+                <c:pt idx="5">
+                  <c:v>43800.0</c:v>
+                </c:pt>
+                <c:pt idx="6">
+                  <c:v>43831.0</c:v>
+                </c:pt>
+                <c:pt idx="7">
+                  <c:v>43862.0</c:v>
+                </c:pt>
+                <c:pt idx="8">
+                  <c:v>43891.0</c:v>
+                </c:pt>
+                <c:pt idx="9">
+                  <c:v>43922.0</c:v>
+                </c:pt>
+                <c:pt idx="10">
+                  <c:v>43952.0</c:v>
+                </c:pt>
+                <c:pt idx="11">
+                  <c:v>43983.0</c:v>
+                </c:pt>
+              </c:numCache>
+            </c:numRef>
+          </c:cat>
+          <c:val>
+            <c:numRef>
+              <c:f>Sheet1!$D$2:$D$13</c:f>
+              <c:numCache>
+                <c:formatCode>General</c:formatCode>
+                <c:ptCount val="12"/>
+                <c:pt idx="0">
+                  <c:v>122.0</c:v>
+                </c:pt>
+                <c:pt idx="1">
+                  <c:v>121.0</c:v>
+                </c:pt>
+                <c:pt idx="2">
+                  <c:v>102.0</c:v>
+                </c:pt>
+                <c:pt idx="3">
+                  <c:v>128.0</c:v>
+                </c:pt>
+                <c:pt idx="4">
+                  <c:v>161.0</c:v>
+                </c:pt>
+                <c:pt idx="5">
+                  <c:v>185.0</c:v>
+                </c:pt>
+                <c:pt idx="6">
+                  <c:v>229.0</c:v>
+                </c:pt>
+                <c:pt idx="7">
+                  <c:v>102.0</c:v>
+                </c:pt>
+                <c:pt idx="8">
+                  <c:v>132.0</c:v>
+                </c:pt>
+                <c:pt idx="9">
+                  <c:v>188.0</c:v>
+                </c:pt>
+                <c:pt idx="10">
+                  <c:v>128.0</c:v>
+                </c:pt>
+                <c:pt idx="11">
+                  <c:v>143.0</c:v>
+                </c:pt>
+              </c:numCache>
+            </c:numRef>
+          </c:val>
+          <c:smooth val="0"/>
+        </c:ser>
+        <c:ser>
+          <c:idx val="3"/>
+          <c:order val="3"/>
+          <c:tx>
+            <c:strRef>
+              <c:f>Sheet1!$E$1</c:f>
+              <c:strCache>
+                <c:ptCount val="1"/>
+                <c:pt idx="0">
+                  <c:v>FY17</c:v>
+                </c:pt>
+              </c:strCache>
+            </c:strRef>
+          </c:tx>
+          <c:marker>
+            <c:symbol val="none"/>
+          </c:marker>
+          <c:cat>
+            <c:numRef>
+              <c:f>Sheet1!$A$2:$A$13</c:f>
+              <c:numCache>
+                <c:formatCode>yyyy\-mm\-dd</c:formatCode>
+                <c:ptCount val="12"/>
+                <c:pt idx="0">
+                  <c:v>43647.0</c:v>
+                </c:pt>
+                <c:pt idx="1">
+                  <c:v>43678.0</c:v>
+                </c:pt>
+                <c:pt idx="2">
+                  <c:v>43709.0</c:v>
+                </c:pt>
+                <c:pt idx="3">
+                  <c:v>43739.0</c:v>
+                </c:pt>
+                <c:pt idx="4">
+                  <c:v>43770.0</c:v>
+                </c:pt>
+                <c:pt idx="5">
+                  <c:v>43800.0</c:v>
+                </c:pt>
+                <c:pt idx="6">
+                  <c:v>43831.0</c:v>
+                </c:pt>
+                <c:pt idx="7">
+                  <c:v>43862.0</c:v>
+                </c:pt>
+                <c:pt idx="8">
+                  <c:v>43891.0</c:v>
+                </c:pt>
+                <c:pt idx="9">
+                  <c:v>43922.0</c:v>
+                </c:pt>
+                <c:pt idx="10">
+                  <c:v>43952.0</c:v>
+                </c:pt>
+                <c:pt idx="11">
+                  <c:v>43983.0</c:v>
+                </c:pt>
+              </c:numCache>
+            </c:numRef>
+          </c:cat>
+          <c:val>
+            <c:numRef>
+              <c:f>Sheet1!$E$2:$E$13</c:f>
+              <c:numCache>
+                <c:formatCode>General</c:formatCode>
+                <c:ptCount val="12"/>
+                <c:pt idx="0">
+                  <c:v>82.0</c:v>
+                </c:pt>
+                <c:pt idx="1">
+                  <c:v>96.0</c:v>
+                </c:pt>
+                <c:pt idx="2">
+                  <c:v>152.0</c:v>
+                </c:pt>
+                <c:pt idx="3">
+                  <c:v>134.0</c:v>
+                </c:pt>
+                <c:pt idx="4">
+                  <c:v>186.0</c:v>
+                </c:pt>
+                <c:pt idx="5">
+                  <c:v>157.0</c:v>
+                </c:pt>
+                <c:pt idx="6">
+                  <c:v>203.0</c:v>
+                </c:pt>
+                <c:pt idx="7">
+                  <c:v>137.0</c:v>
+                </c:pt>
+                <c:pt idx="8">
+                  <c:v>155.0</c:v>
+                </c:pt>
+                <c:pt idx="9">
+                  <c:v>197.0</c:v>
+                </c:pt>
+                <c:pt idx="10">
+                  <c:v>145.0</c:v>
+                </c:pt>
+                <c:pt idx="11">
+                  <c:v>157.0</c:v>
+                </c:pt>
+              </c:numCache>
+            </c:numRef>
+          </c:val>
+          <c:smooth val="0"/>
+        </c:ser>
+        <c:marker val="1"/>
+        <c:smooth val="0"/>
+        <c:axId val="2118791784"/>
+        <c:axId val="2140495176"/>
+      </c:lineChart>
+      <c:dateAx>
+        <c:axId val="2118791784"/>
+        <c:scaling>
+          <c:orientation val="minMax"/>
+        </c:scaling>
+        <c:delete val="0"/>
+        <c:axPos val="b"/>
+        <c:numFmt formatCode="yyyy\-mm\-dd" sourceLinked="1"/>
+        <c:majorTickMark val="out"/>
+        <c:minorTickMark val="none"/>
+        <c:tickLblPos val="nextTo"/>
+        <c:crossAx val="2140495176"/>
+        <c:crosses val="autoZero"/>
+        <c:auto val="1"/>
+        <c:lblOffset val="100"/>
+        <c:baseTimeUnit val="days"/>
+      </c:dateAx>
+      <c:valAx>
+        <c:axId val="2140495176"/>
+        <c:scaling/>
+        <c:delete val="0"/>
+        <c:axPos val="l"/>
+        <c:majorGridlines/>
+        <c:title>
+          <c:tx>
+            <c:rich>
+              <a:bodyPr/>
+              <a:lstStyle/>
+              <a:p>
+                <a:r>
+                  <a:t>Doses per month</a:t>
+                </a:r>
+              </a:p>
+            </c:rich>
+          </c:tx>
+          <c:layout/>
+          <c:overlay val="0"/>
+        </c:title>
+        <c:majorTickMark val="out"/>
+        <c:minorTickMark val="none"/>
+        <c:tickLblPos val="nextTo"/>
+        <c:crossAx val="2118791784"/>
+        <c:crosses val="autoZero"/>
+      </c:valAx>
+    </c:plotArea>
+    <c:legend>
+      <c:legendPos val="r"/>
+      <c:layout/>
+      <c:overlay val="0"/>
+    </c:legend>
+    <c:plotVisOnly val="1"/>
+    <c:dispBlanksAs val="gap"/>
+    <c:showDLblsOverMax val="0"/>
+  </c:chart>
+  <c:txPr>
+    <a:bodyPr/>
+    <a:lstStyle/>
+    <a:p>
+      <a:pPr>
+        <a:defRPr sz="1800"/>
+      </a:pPr>
+      <a:endParaRPr lang="en-US"/>
+    </a:p>
+  </c:txPr>
+  <c:externalData r:id="rId1">
+    <c:autoUpdate val="0"/>
+  </c:externalData>
+</c:chartSpace>
+</file>
+
+<file path=ppt/charts/chart18.xml><?xml version="1.0" encoding="utf-8"?>
 <c:chartSpace xmlns:c="http://schemas.openxmlformats.org/drawingml/2006/chart" xmlns:a="http://schemas.openxmlformats.org/drawingml/2006/main" xmlns:r="http://schemas.openxmlformats.org/officeDocument/2006/relationships">
   <c:date1904 val="0"/>
   <c:chart>
@@ -7462,7 +7965,7 @@
           <a:lstStyle/>
           <a:p>
             <a:r>
-              <a:t>IVIG utilization</a:t>
+              <a:t>IVIG utilization (inpatient)</a:t>
             </a:r>
           </a:p>
         </c:rich>
@@ -7544,7 +8047,7 @@
                 <c:formatCode>General</c:formatCode>
                 <c:ptCount val="12"/>
                 <c:pt idx="0">
-                  <c:v>2.0</c:v>
+                  <c:v>59.0</c:v>
                 </c:pt>
               </c:numCache>
             </c:numRef>
@@ -7620,40 +8123,40 @@
                 <c:formatCode>General</c:formatCode>
                 <c:ptCount val="12"/>
                 <c:pt idx="0">
-                  <c:v>24.0</c:v>
+                  <c:v>37.0</c:v>
                 </c:pt>
                 <c:pt idx="1">
-                  <c:v>29.0</c:v>
+                  <c:v>46.0</c:v>
                 </c:pt>
                 <c:pt idx="2">
-                  <c:v>9.0</c:v>
+                  <c:v>33.0</c:v>
                 </c:pt>
                 <c:pt idx="3">
-                  <c:v>2.0</c:v>
+                  <c:v>36.0</c:v>
                 </c:pt>
                 <c:pt idx="4">
-                  <c:v>0.0</c:v>
+                  <c:v>36.0</c:v>
                 </c:pt>
                 <c:pt idx="5">
-                  <c:v>4.0</c:v>
+                  <c:v>34.0</c:v>
                 </c:pt>
                 <c:pt idx="6">
+                  <c:v>54.0</c:v>
+                </c:pt>
+                <c:pt idx="7">
                   <c:v>28.0</c:v>
                 </c:pt>
-                <c:pt idx="7">
-                  <c:v>18.0</c:v>
-                </c:pt>
                 <c:pt idx="8">
-                  <c:v>24.0</c:v>
+                  <c:v>41.0</c:v>
                 </c:pt>
                 <c:pt idx="9">
-                  <c:v>18.0</c:v>
+                  <c:v>63.0</c:v>
                 </c:pt>
                 <c:pt idx="10">
-                  <c:v>6.0</c:v>
+                  <c:v>46.0</c:v>
                 </c:pt>
                 <c:pt idx="11">
-                  <c:v>4.0</c:v>
+                  <c:v>55.0</c:v>
                 </c:pt>
               </c:numCache>
             </c:numRef>
@@ -7729,40 +8232,40 @@
                 <c:formatCode>General</c:formatCode>
                 <c:ptCount val="12"/>
                 <c:pt idx="0">
-                  <c:v>70.0</c:v>
+                  <c:v>54.0</c:v>
                 </c:pt>
                 <c:pt idx="1">
-                  <c:v>31.0</c:v>
+                  <c:v>19.0</c:v>
                 </c:pt>
                 <c:pt idx="2">
-                  <c:v>39.0</c:v>
+                  <c:v>22.0</c:v>
                 </c:pt>
                 <c:pt idx="3">
-                  <c:v>38.0</c:v>
+                  <c:v>26.0</c:v>
                 </c:pt>
                 <c:pt idx="4">
-                  <c:v>60.0</c:v>
+                  <c:v>44.0</c:v>
                 </c:pt>
                 <c:pt idx="5">
-                  <c:v>87.0</c:v>
+                  <c:v>69.0</c:v>
                 </c:pt>
                 <c:pt idx="6">
-                  <c:v>65.0</c:v>
+                  <c:v>55.0</c:v>
                 </c:pt>
                 <c:pt idx="7">
-                  <c:v>30.0</c:v>
+                  <c:v>35.0</c:v>
                 </c:pt>
                 <c:pt idx="8">
-                  <c:v>55.0</c:v>
+                  <c:v>68.0</c:v>
                 </c:pt>
                 <c:pt idx="9">
-                  <c:v>27.0</c:v>
+                  <c:v>36.0</c:v>
                 </c:pt>
                 <c:pt idx="10">
-                  <c:v>28.0</c:v>
+                  <c:v>32.0</c:v>
                 </c:pt>
                 <c:pt idx="11">
-                  <c:v>31.0</c:v>
+                  <c:v>48.0</c:v>
                 </c:pt>
               </c:numCache>
             </c:numRef>
@@ -7838,40 +8341,40 @@
                 <c:formatCode>General</c:formatCode>
                 <c:ptCount val="12"/>
                 <c:pt idx="0">
-                  <c:v>62.0</c:v>
+                  <c:v>52.0</c:v>
                 </c:pt>
                 <c:pt idx="1">
-                  <c:v>34.0</c:v>
+                  <c:v>25.0</c:v>
                 </c:pt>
                 <c:pt idx="2">
+                  <c:v>24.0</c:v>
+                </c:pt>
+                <c:pt idx="3">
+                  <c:v>47.0</c:v>
+                </c:pt>
+                <c:pt idx="4">
+                  <c:v>44.0</c:v>
+                </c:pt>
+                <c:pt idx="5">
+                  <c:v>35.0</c:v>
+                </c:pt>
+                <c:pt idx="6">
+                  <c:v>25.0</c:v>
+                </c:pt>
+                <c:pt idx="7">
+                  <c:v>31.0</c:v>
+                </c:pt>
+                <c:pt idx="8">
                   <c:v>33.0</c:v>
                 </c:pt>
-                <c:pt idx="3">
-                  <c:v>59.0</c:v>
-                </c:pt>
-                <c:pt idx="4">
-                  <c:v>60.0</c:v>
-                </c:pt>
-                <c:pt idx="5">
-                  <c:v>47.0</c:v>
-                </c:pt>
-                <c:pt idx="6">
-                  <c:v>42.0</c:v>
-                </c:pt>
-                <c:pt idx="7">
-                  <c:v>47.0</c:v>
-                </c:pt>
-                <c:pt idx="8">
+                <c:pt idx="9">
+                  <c:v>45.0</c:v>
+                </c:pt>
+                <c:pt idx="10">
                   <c:v>48.0</c:v>
                 </c:pt>
-                <c:pt idx="9">
-                  <c:v>57.0</c:v>
-                </c:pt>
-                <c:pt idx="10">
-                  <c:v>62.0</c:v>
-                </c:pt>
                 <c:pt idx="11">
-                  <c:v>69.0</c:v>
+                  <c:v>48.0</c:v>
                 </c:pt>
               </c:numCache>
             </c:numRef>
@@ -7964,7 +8467,7 @@
           <a:lstStyle/>
           <a:p>
             <a:r>
-              <a:t>Calcitonin utilization</a:t>
+              <a:t>IVIG utilization (outpatient)</a:t>
             </a:r>
           </a:p>
         </c:rich>
@@ -8046,7 +8549,7 @@
                 <c:formatCode>General</c:formatCode>
                 <c:ptCount val="12"/>
                 <c:pt idx="0">
-                  <c:v>2.0</c:v>
+                  <c:v>23.0</c:v>
                 </c:pt>
               </c:numCache>
             </c:numRef>
@@ -8122,40 +8625,40 @@
                 <c:formatCode>General</c:formatCode>
                 <c:ptCount val="12"/>
                 <c:pt idx="0">
-                  <c:v>0.0</c:v>
+                  <c:v>23.0</c:v>
                 </c:pt>
                 <c:pt idx="1">
-                  <c:v>16.0</c:v>
+                  <c:v>20.0</c:v>
                 </c:pt>
                 <c:pt idx="2">
-                  <c:v>6.0</c:v>
+                  <c:v>19.0</c:v>
                 </c:pt>
                 <c:pt idx="3">
-                  <c:v>2.0</c:v>
+                  <c:v>21.0</c:v>
                 </c:pt>
                 <c:pt idx="4">
-                  <c:v>0.0</c:v>
+                  <c:v>20.0</c:v>
                 </c:pt>
                 <c:pt idx="5">
-                  <c:v>9.0</c:v>
+                  <c:v>23.0</c:v>
                 </c:pt>
                 <c:pt idx="6">
-                  <c:v>13.0</c:v>
+                  <c:v>34.0</c:v>
                 </c:pt>
                 <c:pt idx="7">
-                  <c:v>0.0</c:v>
+                  <c:v>21.0</c:v>
                 </c:pt>
                 <c:pt idx="8">
-                  <c:v>11.0</c:v>
+                  <c:v>24.0</c:v>
                 </c:pt>
                 <c:pt idx="9">
-                  <c:v>12.0</c:v>
+                  <c:v>28.0</c:v>
                 </c:pt>
                 <c:pt idx="10">
-                  <c:v>6.0</c:v>
+                  <c:v>23.0</c:v>
                 </c:pt>
                 <c:pt idx="11">
-                  <c:v>5.0</c:v>
+                  <c:v>22.0</c:v>
                 </c:pt>
               </c:numCache>
             </c:numRef>
@@ -8231,40 +8734,40 @@
                 <c:formatCode>General</c:formatCode>
                 <c:ptCount val="12"/>
                 <c:pt idx="0">
-                  <c:v>2.0</c:v>
+                  <c:v>19.0</c:v>
                 </c:pt>
                 <c:pt idx="1">
-                  <c:v>12.0</c:v>
+                  <c:v>20.0</c:v>
                 </c:pt>
                 <c:pt idx="2">
-                  <c:v>8.0</c:v>
+                  <c:v>22.0</c:v>
                 </c:pt>
                 <c:pt idx="3">
-                  <c:v>1.0</c:v>
+                  <c:v>16.0</c:v>
                 </c:pt>
                 <c:pt idx="4">
-                  <c:v>1.0</c:v>
+                  <c:v>20.0</c:v>
                 </c:pt>
                 <c:pt idx="5">
-                  <c:v>6.0</c:v>
+                  <c:v>21.0</c:v>
                 </c:pt>
                 <c:pt idx="6">
-                  <c:v>18.0</c:v>
+                  <c:v>16.0</c:v>
                 </c:pt>
                 <c:pt idx="7">
-                  <c:v>8.0</c:v>
+                  <c:v>20.0</c:v>
                 </c:pt>
                 <c:pt idx="8">
-                  <c:v>4.0</c:v>
+                  <c:v>26.0</c:v>
                 </c:pt>
                 <c:pt idx="9">
-                  <c:v>4.0</c:v>
+                  <c:v>24.0</c:v>
                 </c:pt>
                 <c:pt idx="10">
-                  <c:v>17.0</c:v>
+                  <c:v>22.0</c:v>
                 </c:pt>
                 <c:pt idx="11">
-                  <c:v>1.0</c:v>
+                  <c:v>25.0</c:v>
                 </c:pt>
               </c:numCache>
             </c:numRef>
@@ -8340,40 +8843,40 @@
                 <c:formatCode>General</c:formatCode>
                 <c:ptCount val="12"/>
                 <c:pt idx="0">
-                  <c:v>59.0</c:v>
+                  <c:v>12.0</c:v>
                 </c:pt>
                 <c:pt idx="1">
+                  <c:v>12.0</c:v>
+                </c:pt>
+                <c:pt idx="2">
+                  <c:v>15.0</c:v>
+                </c:pt>
+                <c:pt idx="3">
+                  <c:v>15.0</c:v>
+                </c:pt>
+                <c:pt idx="4">
                   <c:v>19.0</c:v>
                 </c:pt>
-                <c:pt idx="2">
-                  <c:v>4.0</c:v>
-                </c:pt>
-                <c:pt idx="3">
-                  <c:v>3.0</c:v>
-                </c:pt>
-                <c:pt idx="4">
-                  <c:v>4.0</c:v>
-                </c:pt>
                 <c:pt idx="5">
-                  <c:v>1.0</c:v>
+                  <c:v>15.0</c:v>
                 </c:pt>
                 <c:pt idx="6">
-                  <c:v>2.0</c:v>
+                  <c:v>20.0</c:v>
                 </c:pt>
                 <c:pt idx="7">
-                  <c:v>0.0</c:v>
+                  <c:v>17.0</c:v>
                 </c:pt>
                 <c:pt idx="8">
-                  <c:v>6.0</c:v>
+                  <c:v>19.0</c:v>
                 </c:pt>
                 <c:pt idx="9">
-                  <c:v>9.0</c:v>
+                  <c:v>15.0</c:v>
                 </c:pt>
                 <c:pt idx="10">
-                  <c:v>23.0</c:v>
+                  <c:v>18.0</c:v>
                 </c:pt>
                 <c:pt idx="11">
-                  <c:v>10.0</c:v>
+                  <c:v>24.0</c:v>
                 </c:pt>
               </c:numCache>
             </c:numRef>
@@ -11686,6 +12189,42 @@
 </p:sld>
 </file>
 
+<file path=ppt/slides/slide19.xml><?xml version="1.0" encoding="utf-8"?>
+<p:sld xmlns:a="http://schemas.openxmlformats.org/drawingml/2006/main" xmlns:p="http://schemas.openxmlformats.org/presentationml/2006/main" xmlns:r="http://schemas.openxmlformats.org/officeDocument/2006/relationships">
+  <p:cSld>
+    <p:spTree>
+      <p:nvGrpSpPr>
+        <p:cNvPr id="1" name=""/>
+        <p:cNvGrpSpPr/>
+        <p:nvPr/>
+      </p:nvGrpSpPr>
+      <p:grpSpPr/>
+      <p:graphicFrame>
+        <p:nvGraphicFramePr>
+          <p:cNvPr id="2" name="Chart 1"/>
+          <p:cNvGraphicFramePr>
+            <a:graphicFrameLocks noGrp="1"/>
+          </p:cNvGraphicFramePr>
+          <p:nvPr/>
+        </p:nvGraphicFramePr>
+        <p:xfrm>
+          <a:off x="457200" y="914400"/>
+          <a:ext cx="8229600" cy="5486400"/>
+        </p:xfrm>
+        <a:graphic>
+          <a:graphicData uri="http://schemas.openxmlformats.org/drawingml/2006/chart">
+            <c:chart xmlns:c="http://schemas.openxmlformats.org/drawingml/2006/chart" r:id="rId2"/>
+          </a:graphicData>
+        </a:graphic>
+      </p:graphicFrame>
+    </p:spTree>
+  </p:cSld>
+  <p:clrMapOvr>
+    <a:masterClrMapping/>
+  </p:clrMapOvr>
+</p:sld>
+</file>
+
 <file path=ppt/slides/slide2.xml><?xml version="1.0" encoding="utf-8"?>
 <p:sld xmlns:a="http://schemas.openxmlformats.org/drawingml/2006/main" xmlns:p="http://schemas.openxmlformats.org/presentationml/2006/main" xmlns:r="http://schemas.openxmlformats.org/officeDocument/2006/relationships">
   <p:cSld>

</xml_diff>